<commit_message>
add video material methods
</commit_message>
<xml_diff>
--- a/media/prez1-2/prez1-2.pptx
+++ b/media/prez1-2/prez1-2.pptx
@@ -53,7 +53,7 @@
       </p:grpSpPr>
       <p:sp>
         <p:nvSpPr>
-          <p:cNvPr id="26" name="PlaceHolder 1"/>
+          <p:cNvPr id="22" name="PlaceHolder 1"/>
           <p:cNvSpPr>
             <a:spLocks noGrp="1"/>
           </p:cNvSpPr>
@@ -64,7 +64,7 @@
         <p:spPr>
           <a:xfrm>
             <a:off x="504000" y="226080"/>
-            <a:ext cx="9071640" cy="946440"/>
+            <a:ext cx="9071280" cy="946080"/>
           </a:xfrm>
           <a:prstGeom prst="rect">
             <a:avLst/>
@@ -84,7 +84,7 @@
       </p:sp>
       <p:sp>
         <p:nvSpPr>
-          <p:cNvPr id="27" name="PlaceHolder 2"/>
+          <p:cNvPr id="23" name="PlaceHolder 2"/>
           <p:cNvSpPr>
             <a:spLocks noGrp="1"/>
           </p:cNvSpPr>
@@ -95,37 +95,37 @@
         <p:spPr>
           <a:xfrm>
             <a:off x="504000" y="1326600"/>
-            <a:ext cx="9071640" cy="1568160"/>
-          </a:xfrm>
-          <a:prstGeom prst="rect">
-            <a:avLst/>
-          </a:prstGeom>
-        </p:spPr>
-        <p:txBody>
-          <a:bodyPr lIns="0" rIns="0" tIns="0" bIns="0">
-            <a:normAutofit/>
-          </a:bodyPr>
-          <a:p>
-            <a:endParaRPr b="0" lang="en-US" sz="3200" spc="-1" strike="noStrike">
-              <a:latin typeface="Arial"/>
-            </a:endParaRPr>
-          </a:p>
-        </p:txBody>
-      </p:sp>
-      <p:sp>
-        <p:nvSpPr>
-          <p:cNvPr id="28" name="PlaceHolder 3"/>
-          <p:cNvSpPr>
-            <a:spLocks noGrp="1"/>
-          </p:cNvSpPr>
-          <p:nvPr>
-            <p:ph type="body"/>
-          </p:nvPr>
-        </p:nvSpPr>
-        <p:spPr>
-          <a:xfrm>
-            <a:off x="504000" y="3044160"/>
-            <a:ext cx="9071640" cy="1568160"/>
+            <a:ext cx="9072000" cy="1568520"/>
+          </a:xfrm>
+          <a:prstGeom prst="rect">
+            <a:avLst/>
+          </a:prstGeom>
+        </p:spPr>
+        <p:txBody>
+          <a:bodyPr lIns="0" rIns="0" tIns="0" bIns="0">
+            <a:normAutofit/>
+          </a:bodyPr>
+          <a:p>
+            <a:endParaRPr b="0" lang="en-US" sz="3200" spc="-1" strike="noStrike">
+              <a:latin typeface="Arial"/>
+            </a:endParaRPr>
+          </a:p>
+        </p:txBody>
+      </p:sp>
+      <p:sp>
+        <p:nvSpPr>
+          <p:cNvPr id="24" name="PlaceHolder 3"/>
+          <p:cNvSpPr>
+            <a:spLocks noGrp="1"/>
+          </p:cNvSpPr>
+          <p:nvPr>
+            <p:ph type="body"/>
+          </p:nvPr>
+        </p:nvSpPr>
+        <p:spPr>
+          <a:xfrm>
+            <a:off x="504000" y="3044520"/>
+            <a:ext cx="9072000" cy="1568520"/>
           </a:xfrm>
           <a:prstGeom prst="rect">
             <a:avLst/>
@@ -166,7 +166,7 @@
       </p:grpSpPr>
       <p:sp>
         <p:nvSpPr>
-          <p:cNvPr id="29" name="PlaceHolder 1"/>
+          <p:cNvPr id="25" name="PlaceHolder 1"/>
           <p:cNvSpPr>
             <a:spLocks noGrp="1"/>
           </p:cNvSpPr>
@@ -177,7 +177,7 @@
         <p:spPr>
           <a:xfrm>
             <a:off x="504000" y="226080"/>
-            <a:ext cx="9071640" cy="946440"/>
+            <a:ext cx="9071280" cy="946080"/>
           </a:xfrm>
           <a:prstGeom prst="rect">
             <a:avLst/>
@@ -197,7 +197,7 @@
       </p:sp>
       <p:sp>
         <p:nvSpPr>
-          <p:cNvPr id="30" name="PlaceHolder 2"/>
+          <p:cNvPr id="26" name="PlaceHolder 2"/>
           <p:cNvSpPr>
             <a:spLocks noGrp="1"/>
           </p:cNvSpPr>
@@ -208,26 +208,26 @@
         <p:spPr>
           <a:xfrm>
             <a:off x="504000" y="1326600"/>
-            <a:ext cx="4426920" cy="1568160"/>
-          </a:xfrm>
-          <a:prstGeom prst="rect">
-            <a:avLst/>
-          </a:prstGeom>
-        </p:spPr>
-        <p:txBody>
-          <a:bodyPr lIns="0" rIns="0" tIns="0" bIns="0">
-            <a:normAutofit/>
-          </a:bodyPr>
-          <a:p>
-            <a:endParaRPr b="0" lang="en-US" sz="3200" spc="-1" strike="noStrike">
-              <a:latin typeface="Arial"/>
-            </a:endParaRPr>
-          </a:p>
-        </p:txBody>
-      </p:sp>
-      <p:sp>
-        <p:nvSpPr>
-          <p:cNvPr id="31" name="PlaceHolder 3"/>
+            <a:ext cx="4426920" cy="1568520"/>
+          </a:xfrm>
+          <a:prstGeom prst="rect">
+            <a:avLst/>
+          </a:prstGeom>
+        </p:spPr>
+        <p:txBody>
+          <a:bodyPr lIns="0" rIns="0" tIns="0" bIns="0">
+            <a:normAutofit/>
+          </a:bodyPr>
+          <a:p>
+            <a:endParaRPr b="0" lang="en-US" sz="3200" spc="-1" strike="noStrike">
+              <a:latin typeface="Arial"/>
+            </a:endParaRPr>
+          </a:p>
+        </p:txBody>
+      </p:sp>
+      <p:sp>
+        <p:nvSpPr>
+          <p:cNvPr id="27" name="PlaceHolder 3"/>
           <p:cNvSpPr>
             <a:spLocks noGrp="1"/>
           </p:cNvSpPr>
@@ -238,67 +238,67 @@
         <p:spPr>
           <a:xfrm>
             <a:off x="5152680" y="1326600"/>
-            <a:ext cx="4426920" cy="1568160"/>
-          </a:xfrm>
-          <a:prstGeom prst="rect">
-            <a:avLst/>
-          </a:prstGeom>
-        </p:spPr>
-        <p:txBody>
-          <a:bodyPr lIns="0" rIns="0" tIns="0" bIns="0">
-            <a:normAutofit/>
-          </a:bodyPr>
-          <a:p>
-            <a:endParaRPr b="0" lang="en-US" sz="3200" spc="-1" strike="noStrike">
-              <a:latin typeface="Arial"/>
-            </a:endParaRPr>
-          </a:p>
-        </p:txBody>
-      </p:sp>
-      <p:sp>
-        <p:nvSpPr>
-          <p:cNvPr id="32" name="PlaceHolder 4"/>
-          <p:cNvSpPr>
-            <a:spLocks noGrp="1"/>
-          </p:cNvSpPr>
-          <p:nvPr>
-            <p:ph type="body"/>
-          </p:nvPr>
-        </p:nvSpPr>
-        <p:spPr>
-          <a:xfrm>
-            <a:off x="504000" y="3044160"/>
-            <a:ext cx="4426920" cy="1568160"/>
-          </a:xfrm>
-          <a:prstGeom prst="rect">
-            <a:avLst/>
-          </a:prstGeom>
-        </p:spPr>
-        <p:txBody>
-          <a:bodyPr lIns="0" rIns="0" tIns="0" bIns="0">
-            <a:normAutofit/>
-          </a:bodyPr>
-          <a:p>
-            <a:endParaRPr b="0" lang="en-US" sz="3200" spc="-1" strike="noStrike">
-              <a:latin typeface="Arial"/>
-            </a:endParaRPr>
-          </a:p>
-        </p:txBody>
-      </p:sp>
-      <p:sp>
-        <p:nvSpPr>
-          <p:cNvPr id="33" name="PlaceHolder 5"/>
-          <p:cNvSpPr>
-            <a:spLocks noGrp="1"/>
-          </p:cNvSpPr>
-          <p:nvPr>
-            <p:ph type="body"/>
-          </p:nvPr>
-        </p:nvSpPr>
-        <p:spPr>
-          <a:xfrm>
-            <a:off x="5152680" y="3044160"/>
-            <a:ext cx="4426920" cy="1568160"/>
+            <a:ext cx="4426920" cy="1568520"/>
+          </a:xfrm>
+          <a:prstGeom prst="rect">
+            <a:avLst/>
+          </a:prstGeom>
+        </p:spPr>
+        <p:txBody>
+          <a:bodyPr lIns="0" rIns="0" tIns="0" bIns="0">
+            <a:normAutofit/>
+          </a:bodyPr>
+          <a:p>
+            <a:endParaRPr b="0" lang="en-US" sz="3200" spc="-1" strike="noStrike">
+              <a:latin typeface="Arial"/>
+            </a:endParaRPr>
+          </a:p>
+        </p:txBody>
+      </p:sp>
+      <p:sp>
+        <p:nvSpPr>
+          <p:cNvPr id="28" name="PlaceHolder 4"/>
+          <p:cNvSpPr>
+            <a:spLocks noGrp="1"/>
+          </p:cNvSpPr>
+          <p:nvPr>
+            <p:ph type="body"/>
+          </p:nvPr>
+        </p:nvSpPr>
+        <p:spPr>
+          <a:xfrm>
+            <a:off x="504000" y="3044520"/>
+            <a:ext cx="4426920" cy="1568520"/>
+          </a:xfrm>
+          <a:prstGeom prst="rect">
+            <a:avLst/>
+          </a:prstGeom>
+        </p:spPr>
+        <p:txBody>
+          <a:bodyPr lIns="0" rIns="0" tIns="0" bIns="0">
+            <a:normAutofit/>
+          </a:bodyPr>
+          <a:p>
+            <a:endParaRPr b="0" lang="en-US" sz="3200" spc="-1" strike="noStrike">
+              <a:latin typeface="Arial"/>
+            </a:endParaRPr>
+          </a:p>
+        </p:txBody>
+      </p:sp>
+      <p:sp>
+        <p:nvSpPr>
+          <p:cNvPr id="29" name="PlaceHolder 5"/>
+          <p:cNvSpPr>
+            <a:spLocks noGrp="1"/>
+          </p:cNvSpPr>
+          <p:nvPr>
+            <p:ph type="body"/>
+          </p:nvPr>
+        </p:nvSpPr>
+        <p:spPr>
+          <a:xfrm>
+            <a:off x="5152680" y="3044520"/>
+            <a:ext cx="4426920" cy="1568520"/>
           </a:xfrm>
           <a:prstGeom prst="rect">
             <a:avLst/>
@@ -339,7 +339,7 @@
       </p:grpSpPr>
       <p:sp>
         <p:nvSpPr>
-          <p:cNvPr id="34" name="PlaceHolder 1"/>
+          <p:cNvPr id="30" name="PlaceHolder 1"/>
           <p:cNvSpPr>
             <a:spLocks noGrp="1"/>
           </p:cNvSpPr>
@@ -350,7 +350,7 @@
         <p:spPr>
           <a:xfrm>
             <a:off x="504000" y="226080"/>
-            <a:ext cx="9071640" cy="946440"/>
+            <a:ext cx="9071280" cy="946080"/>
           </a:xfrm>
           <a:prstGeom prst="rect">
             <a:avLst/>
@@ -370,7 +370,7 @@
       </p:sp>
       <p:sp>
         <p:nvSpPr>
-          <p:cNvPr id="35" name="PlaceHolder 2"/>
+          <p:cNvPr id="31" name="PlaceHolder 2"/>
           <p:cNvSpPr>
             <a:spLocks noGrp="1"/>
           </p:cNvSpPr>
@@ -381,157 +381,157 @@
         <p:spPr>
           <a:xfrm>
             <a:off x="504000" y="1326600"/>
-            <a:ext cx="2920680" cy="1568160"/>
-          </a:xfrm>
-          <a:prstGeom prst="rect">
-            <a:avLst/>
-          </a:prstGeom>
-        </p:spPr>
-        <p:txBody>
-          <a:bodyPr lIns="0" rIns="0" tIns="0" bIns="0">
-            <a:normAutofit/>
-          </a:bodyPr>
-          <a:p>
-            <a:endParaRPr b="0" lang="en-US" sz="3200" spc="-1" strike="noStrike">
-              <a:latin typeface="Arial"/>
-            </a:endParaRPr>
-          </a:p>
-        </p:txBody>
-      </p:sp>
-      <p:sp>
-        <p:nvSpPr>
-          <p:cNvPr id="36" name="PlaceHolder 3"/>
-          <p:cNvSpPr>
-            <a:spLocks noGrp="1"/>
-          </p:cNvSpPr>
-          <p:nvPr>
-            <p:ph type="body"/>
-          </p:nvPr>
-        </p:nvSpPr>
-        <p:spPr>
-          <a:xfrm>
-            <a:off x="3571200" y="1326600"/>
-            <a:ext cx="2920680" cy="1568160"/>
-          </a:xfrm>
-          <a:prstGeom prst="rect">
-            <a:avLst/>
-          </a:prstGeom>
-        </p:spPr>
-        <p:txBody>
-          <a:bodyPr lIns="0" rIns="0" tIns="0" bIns="0">
-            <a:normAutofit/>
-          </a:bodyPr>
-          <a:p>
-            <a:endParaRPr b="0" lang="en-US" sz="3200" spc="-1" strike="noStrike">
-              <a:latin typeface="Arial"/>
-            </a:endParaRPr>
-          </a:p>
-        </p:txBody>
-      </p:sp>
-      <p:sp>
-        <p:nvSpPr>
-          <p:cNvPr id="37" name="PlaceHolder 4"/>
-          <p:cNvSpPr>
-            <a:spLocks noGrp="1"/>
-          </p:cNvSpPr>
-          <p:nvPr>
-            <p:ph type="body"/>
-          </p:nvPr>
-        </p:nvSpPr>
-        <p:spPr>
-          <a:xfrm>
-            <a:off x="6638040" y="1326600"/>
-            <a:ext cx="2920680" cy="1568160"/>
-          </a:xfrm>
-          <a:prstGeom prst="rect">
-            <a:avLst/>
-          </a:prstGeom>
-        </p:spPr>
-        <p:txBody>
-          <a:bodyPr lIns="0" rIns="0" tIns="0" bIns="0">
-            <a:normAutofit/>
-          </a:bodyPr>
-          <a:p>
-            <a:endParaRPr b="0" lang="en-US" sz="3200" spc="-1" strike="noStrike">
-              <a:latin typeface="Arial"/>
-            </a:endParaRPr>
-          </a:p>
-        </p:txBody>
-      </p:sp>
-      <p:sp>
-        <p:nvSpPr>
-          <p:cNvPr id="38" name="PlaceHolder 5"/>
-          <p:cNvSpPr>
-            <a:spLocks noGrp="1"/>
-          </p:cNvSpPr>
-          <p:nvPr>
-            <p:ph type="body"/>
-          </p:nvPr>
-        </p:nvSpPr>
-        <p:spPr>
-          <a:xfrm>
-            <a:off x="504000" y="3044160"/>
-            <a:ext cx="2920680" cy="1568160"/>
-          </a:xfrm>
-          <a:prstGeom prst="rect">
-            <a:avLst/>
-          </a:prstGeom>
-        </p:spPr>
-        <p:txBody>
-          <a:bodyPr lIns="0" rIns="0" tIns="0" bIns="0">
-            <a:normAutofit/>
-          </a:bodyPr>
-          <a:p>
-            <a:endParaRPr b="0" lang="en-US" sz="3200" spc="-1" strike="noStrike">
-              <a:latin typeface="Arial"/>
-            </a:endParaRPr>
-          </a:p>
-        </p:txBody>
-      </p:sp>
-      <p:sp>
-        <p:nvSpPr>
-          <p:cNvPr id="39" name="PlaceHolder 6"/>
-          <p:cNvSpPr>
-            <a:spLocks noGrp="1"/>
-          </p:cNvSpPr>
-          <p:nvPr>
-            <p:ph type="body"/>
-          </p:nvPr>
-        </p:nvSpPr>
-        <p:spPr>
-          <a:xfrm>
-            <a:off x="3571200" y="3044160"/>
-            <a:ext cx="2920680" cy="1568160"/>
-          </a:xfrm>
-          <a:prstGeom prst="rect">
-            <a:avLst/>
-          </a:prstGeom>
-        </p:spPr>
-        <p:txBody>
-          <a:bodyPr lIns="0" rIns="0" tIns="0" bIns="0">
-            <a:normAutofit/>
-          </a:bodyPr>
-          <a:p>
-            <a:endParaRPr b="0" lang="en-US" sz="3200" spc="-1" strike="noStrike">
-              <a:latin typeface="Arial"/>
-            </a:endParaRPr>
-          </a:p>
-        </p:txBody>
-      </p:sp>
-      <p:sp>
-        <p:nvSpPr>
-          <p:cNvPr id="40" name="PlaceHolder 7"/>
-          <p:cNvSpPr>
-            <a:spLocks noGrp="1"/>
-          </p:cNvSpPr>
-          <p:nvPr>
-            <p:ph type="body"/>
-          </p:nvPr>
-        </p:nvSpPr>
-        <p:spPr>
-          <a:xfrm>
-            <a:off x="6638040" y="3044160"/>
-            <a:ext cx="2920680" cy="1568160"/>
+            <a:ext cx="2921040" cy="1568520"/>
+          </a:xfrm>
+          <a:prstGeom prst="rect">
+            <a:avLst/>
+          </a:prstGeom>
+        </p:spPr>
+        <p:txBody>
+          <a:bodyPr lIns="0" rIns="0" tIns="0" bIns="0">
+            <a:normAutofit/>
+          </a:bodyPr>
+          <a:p>
+            <a:endParaRPr b="0" lang="en-US" sz="3200" spc="-1" strike="noStrike">
+              <a:latin typeface="Arial"/>
+            </a:endParaRPr>
+          </a:p>
+        </p:txBody>
+      </p:sp>
+      <p:sp>
+        <p:nvSpPr>
+          <p:cNvPr id="32" name="PlaceHolder 3"/>
+          <p:cNvSpPr>
+            <a:spLocks noGrp="1"/>
+          </p:cNvSpPr>
+          <p:nvPr>
+            <p:ph type="body"/>
+          </p:nvPr>
+        </p:nvSpPr>
+        <p:spPr>
+          <a:xfrm>
+            <a:off x="3571560" y="1326600"/>
+            <a:ext cx="2921040" cy="1568520"/>
+          </a:xfrm>
+          <a:prstGeom prst="rect">
+            <a:avLst/>
+          </a:prstGeom>
+        </p:spPr>
+        <p:txBody>
+          <a:bodyPr lIns="0" rIns="0" tIns="0" bIns="0">
+            <a:normAutofit/>
+          </a:bodyPr>
+          <a:p>
+            <a:endParaRPr b="0" lang="en-US" sz="3200" spc="-1" strike="noStrike">
+              <a:latin typeface="Arial"/>
+            </a:endParaRPr>
+          </a:p>
+        </p:txBody>
+      </p:sp>
+      <p:sp>
+        <p:nvSpPr>
+          <p:cNvPr id="33" name="PlaceHolder 4"/>
+          <p:cNvSpPr>
+            <a:spLocks noGrp="1"/>
+          </p:cNvSpPr>
+          <p:nvPr>
+            <p:ph type="body"/>
+          </p:nvPr>
+        </p:nvSpPr>
+        <p:spPr>
+          <a:xfrm>
+            <a:off x="6639120" y="1326600"/>
+            <a:ext cx="2921040" cy="1568520"/>
+          </a:xfrm>
+          <a:prstGeom prst="rect">
+            <a:avLst/>
+          </a:prstGeom>
+        </p:spPr>
+        <p:txBody>
+          <a:bodyPr lIns="0" rIns="0" tIns="0" bIns="0">
+            <a:normAutofit/>
+          </a:bodyPr>
+          <a:p>
+            <a:endParaRPr b="0" lang="en-US" sz="3200" spc="-1" strike="noStrike">
+              <a:latin typeface="Arial"/>
+            </a:endParaRPr>
+          </a:p>
+        </p:txBody>
+      </p:sp>
+      <p:sp>
+        <p:nvSpPr>
+          <p:cNvPr id="34" name="PlaceHolder 5"/>
+          <p:cNvSpPr>
+            <a:spLocks noGrp="1"/>
+          </p:cNvSpPr>
+          <p:nvPr>
+            <p:ph type="body"/>
+          </p:nvPr>
+        </p:nvSpPr>
+        <p:spPr>
+          <a:xfrm>
+            <a:off x="504000" y="3044520"/>
+            <a:ext cx="2921040" cy="1568520"/>
+          </a:xfrm>
+          <a:prstGeom prst="rect">
+            <a:avLst/>
+          </a:prstGeom>
+        </p:spPr>
+        <p:txBody>
+          <a:bodyPr lIns="0" rIns="0" tIns="0" bIns="0">
+            <a:normAutofit/>
+          </a:bodyPr>
+          <a:p>
+            <a:endParaRPr b="0" lang="en-US" sz="3200" spc="-1" strike="noStrike">
+              <a:latin typeface="Arial"/>
+            </a:endParaRPr>
+          </a:p>
+        </p:txBody>
+      </p:sp>
+      <p:sp>
+        <p:nvSpPr>
+          <p:cNvPr id="35" name="PlaceHolder 6"/>
+          <p:cNvSpPr>
+            <a:spLocks noGrp="1"/>
+          </p:cNvSpPr>
+          <p:nvPr>
+            <p:ph type="body"/>
+          </p:nvPr>
+        </p:nvSpPr>
+        <p:spPr>
+          <a:xfrm>
+            <a:off x="3571560" y="3044520"/>
+            <a:ext cx="2921040" cy="1568520"/>
+          </a:xfrm>
+          <a:prstGeom prst="rect">
+            <a:avLst/>
+          </a:prstGeom>
+        </p:spPr>
+        <p:txBody>
+          <a:bodyPr lIns="0" rIns="0" tIns="0" bIns="0">
+            <a:normAutofit/>
+          </a:bodyPr>
+          <a:p>
+            <a:endParaRPr b="0" lang="en-US" sz="3200" spc="-1" strike="noStrike">
+              <a:latin typeface="Arial"/>
+            </a:endParaRPr>
+          </a:p>
+        </p:txBody>
+      </p:sp>
+      <p:sp>
+        <p:nvSpPr>
+          <p:cNvPr id="36" name="PlaceHolder 7"/>
+          <p:cNvSpPr>
+            <a:spLocks noGrp="1"/>
+          </p:cNvSpPr>
+          <p:nvPr>
+            <p:ph type="body"/>
+          </p:nvPr>
+        </p:nvSpPr>
+        <p:spPr>
+          <a:xfrm>
+            <a:off x="6639120" y="3044520"/>
+            <a:ext cx="2921040" cy="1568520"/>
           </a:xfrm>
           <a:prstGeom prst="rect">
             <a:avLst/>
@@ -572,7 +572,7 @@
       </p:grpSpPr>
       <p:sp>
         <p:nvSpPr>
-          <p:cNvPr id="5" name="PlaceHolder 1"/>
+          <p:cNvPr id="1" name="PlaceHolder 1"/>
           <p:cNvSpPr>
             <a:spLocks noGrp="1"/>
           </p:cNvSpPr>
@@ -583,7 +583,7 @@
         <p:spPr>
           <a:xfrm>
             <a:off x="504000" y="226080"/>
-            <a:ext cx="9071640" cy="946440"/>
+            <a:ext cx="9071280" cy="946080"/>
           </a:xfrm>
           <a:prstGeom prst="rect">
             <a:avLst/>
@@ -603,7 +603,7 @@
       </p:sp>
       <p:sp>
         <p:nvSpPr>
-          <p:cNvPr id="6" name="PlaceHolder 2"/>
+          <p:cNvPr id="2" name="PlaceHolder 2"/>
           <p:cNvSpPr>
             <a:spLocks noGrp="1"/>
           </p:cNvSpPr>
@@ -614,7 +614,7 @@
         <p:spPr>
           <a:xfrm>
             <a:off x="504000" y="1326600"/>
-            <a:ext cx="9071640" cy="3288240"/>
+            <a:ext cx="9072000" cy="3288600"/>
           </a:xfrm>
           <a:prstGeom prst="rect">
             <a:avLst/>
@@ -656,7 +656,7 @@
       </p:grpSpPr>
       <p:sp>
         <p:nvSpPr>
-          <p:cNvPr id="7" name="PlaceHolder 1"/>
+          <p:cNvPr id="3" name="PlaceHolder 1"/>
           <p:cNvSpPr>
             <a:spLocks noGrp="1"/>
           </p:cNvSpPr>
@@ -667,7 +667,7 @@
         <p:spPr>
           <a:xfrm>
             <a:off x="504000" y="226080"/>
-            <a:ext cx="9071640" cy="946440"/>
+            <a:ext cx="9071280" cy="946080"/>
           </a:xfrm>
           <a:prstGeom prst="rect">
             <a:avLst/>
@@ -687,7 +687,7 @@
       </p:sp>
       <p:sp>
         <p:nvSpPr>
-          <p:cNvPr id="8" name="PlaceHolder 2"/>
+          <p:cNvPr id="4" name="PlaceHolder 2"/>
           <p:cNvSpPr>
             <a:spLocks noGrp="1"/>
           </p:cNvSpPr>
@@ -698,7 +698,7 @@
         <p:spPr>
           <a:xfrm>
             <a:off x="504000" y="1326600"/>
-            <a:ext cx="9071640" cy="3288240"/>
+            <a:ext cx="9072000" cy="3288600"/>
           </a:xfrm>
           <a:prstGeom prst="rect">
             <a:avLst/>
@@ -739,7 +739,7 @@
       </p:grpSpPr>
       <p:sp>
         <p:nvSpPr>
-          <p:cNvPr id="9" name="PlaceHolder 1"/>
+          <p:cNvPr id="5" name="PlaceHolder 1"/>
           <p:cNvSpPr>
             <a:spLocks noGrp="1"/>
           </p:cNvSpPr>
@@ -750,7 +750,7 @@
         <p:spPr>
           <a:xfrm>
             <a:off x="504000" y="226080"/>
-            <a:ext cx="9071640" cy="946440"/>
+            <a:ext cx="9071280" cy="946080"/>
           </a:xfrm>
           <a:prstGeom prst="rect">
             <a:avLst/>
@@ -770,7 +770,7 @@
       </p:sp>
       <p:sp>
         <p:nvSpPr>
-          <p:cNvPr id="10" name="PlaceHolder 2"/>
+          <p:cNvPr id="6" name="PlaceHolder 2"/>
           <p:cNvSpPr>
             <a:spLocks noGrp="1"/>
           </p:cNvSpPr>
@@ -781,26 +781,26 @@
         <p:spPr>
           <a:xfrm>
             <a:off x="504000" y="1326600"/>
-            <a:ext cx="4426920" cy="3288240"/>
-          </a:xfrm>
-          <a:prstGeom prst="rect">
-            <a:avLst/>
-          </a:prstGeom>
-        </p:spPr>
-        <p:txBody>
-          <a:bodyPr lIns="0" rIns="0" tIns="0" bIns="0">
-            <a:normAutofit/>
-          </a:bodyPr>
-          <a:p>
-            <a:endParaRPr b="0" lang="en-US" sz="3200" spc="-1" strike="noStrike">
-              <a:latin typeface="Arial"/>
-            </a:endParaRPr>
-          </a:p>
-        </p:txBody>
-      </p:sp>
-      <p:sp>
-        <p:nvSpPr>
-          <p:cNvPr id="11" name="PlaceHolder 3"/>
+            <a:ext cx="4426920" cy="3288600"/>
+          </a:xfrm>
+          <a:prstGeom prst="rect">
+            <a:avLst/>
+          </a:prstGeom>
+        </p:spPr>
+        <p:txBody>
+          <a:bodyPr lIns="0" rIns="0" tIns="0" bIns="0">
+            <a:normAutofit/>
+          </a:bodyPr>
+          <a:p>
+            <a:endParaRPr b="0" lang="en-US" sz="3200" spc="-1" strike="noStrike">
+              <a:latin typeface="Arial"/>
+            </a:endParaRPr>
+          </a:p>
+        </p:txBody>
+      </p:sp>
+      <p:sp>
+        <p:nvSpPr>
+          <p:cNvPr id="7" name="PlaceHolder 3"/>
           <p:cNvSpPr>
             <a:spLocks noGrp="1"/>
           </p:cNvSpPr>
@@ -811,7 +811,7 @@
         <p:spPr>
           <a:xfrm>
             <a:off x="5152680" y="1326600"/>
-            <a:ext cx="4426920" cy="3288240"/>
+            <a:ext cx="4426920" cy="3288600"/>
           </a:xfrm>
           <a:prstGeom prst="rect">
             <a:avLst/>
@@ -852,7 +852,7 @@
       </p:grpSpPr>
       <p:sp>
         <p:nvSpPr>
-          <p:cNvPr id="12" name="PlaceHolder 1"/>
+          <p:cNvPr id="8" name="PlaceHolder 1"/>
           <p:cNvSpPr>
             <a:spLocks noGrp="1"/>
           </p:cNvSpPr>
@@ -863,7 +863,7 @@
         <p:spPr>
           <a:xfrm>
             <a:off x="504000" y="226080"/>
-            <a:ext cx="9071640" cy="946440"/>
+            <a:ext cx="9071280" cy="946080"/>
           </a:xfrm>
           <a:prstGeom prst="rect">
             <a:avLst/>
@@ -905,7 +905,7 @@
       </p:grpSpPr>
       <p:sp>
         <p:nvSpPr>
-          <p:cNvPr id="13" name="PlaceHolder 1"/>
+          <p:cNvPr id="9" name="PlaceHolder 1"/>
           <p:cNvSpPr>
             <a:spLocks noGrp="1"/>
           </p:cNvSpPr>
@@ -916,7 +916,7 @@
         <p:spPr>
           <a:xfrm>
             <a:off x="504000" y="226080"/>
-            <a:ext cx="9071640" cy="4388400"/>
+            <a:ext cx="9071280" cy="4386600"/>
           </a:xfrm>
           <a:prstGeom prst="rect">
             <a:avLst/>
@@ -958,7 +958,7 @@
       </p:grpSpPr>
       <p:sp>
         <p:nvSpPr>
-          <p:cNvPr id="14" name="PlaceHolder 1"/>
+          <p:cNvPr id="10" name="PlaceHolder 1"/>
           <p:cNvSpPr>
             <a:spLocks noGrp="1"/>
           </p:cNvSpPr>
@@ -969,7 +969,7 @@
         <p:spPr>
           <a:xfrm>
             <a:off x="504000" y="226080"/>
-            <a:ext cx="9071640" cy="946440"/>
+            <a:ext cx="9071280" cy="946080"/>
           </a:xfrm>
           <a:prstGeom prst="rect">
             <a:avLst/>
@@ -989,7 +989,7 @@
       </p:sp>
       <p:sp>
         <p:nvSpPr>
-          <p:cNvPr id="15" name="PlaceHolder 2"/>
+          <p:cNvPr id="11" name="PlaceHolder 2"/>
           <p:cNvSpPr>
             <a:spLocks noGrp="1"/>
           </p:cNvSpPr>
@@ -1000,26 +1000,26 @@
         <p:spPr>
           <a:xfrm>
             <a:off x="504000" y="1326600"/>
-            <a:ext cx="4426920" cy="1568160"/>
-          </a:xfrm>
-          <a:prstGeom prst="rect">
-            <a:avLst/>
-          </a:prstGeom>
-        </p:spPr>
-        <p:txBody>
-          <a:bodyPr lIns="0" rIns="0" tIns="0" bIns="0">
-            <a:normAutofit/>
-          </a:bodyPr>
-          <a:p>
-            <a:endParaRPr b="0" lang="en-US" sz="3200" spc="-1" strike="noStrike">
-              <a:latin typeface="Arial"/>
-            </a:endParaRPr>
-          </a:p>
-        </p:txBody>
-      </p:sp>
-      <p:sp>
-        <p:nvSpPr>
-          <p:cNvPr id="16" name="PlaceHolder 3"/>
+            <a:ext cx="4426920" cy="1568520"/>
+          </a:xfrm>
+          <a:prstGeom prst="rect">
+            <a:avLst/>
+          </a:prstGeom>
+        </p:spPr>
+        <p:txBody>
+          <a:bodyPr lIns="0" rIns="0" tIns="0" bIns="0">
+            <a:normAutofit/>
+          </a:bodyPr>
+          <a:p>
+            <a:endParaRPr b="0" lang="en-US" sz="3200" spc="-1" strike="noStrike">
+              <a:latin typeface="Arial"/>
+            </a:endParaRPr>
+          </a:p>
+        </p:txBody>
+      </p:sp>
+      <p:sp>
+        <p:nvSpPr>
+          <p:cNvPr id="12" name="PlaceHolder 3"/>
           <p:cNvSpPr>
             <a:spLocks noGrp="1"/>
           </p:cNvSpPr>
@@ -1030,37 +1030,37 @@
         <p:spPr>
           <a:xfrm>
             <a:off x="5152680" y="1326600"/>
-            <a:ext cx="4426920" cy="3288240"/>
-          </a:xfrm>
-          <a:prstGeom prst="rect">
-            <a:avLst/>
-          </a:prstGeom>
-        </p:spPr>
-        <p:txBody>
-          <a:bodyPr lIns="0" rIns="0" tIns="0" bIns="0">
-            <a:normAutofit/>
-          </a:bodyPr>
-          <a:p>
-            <a:endParaRPr b="0" lang="en-US" sz="3200" spc="-1" strike="noStrike">
-              <a:latin typeface="Arial"/>
-            </a:endParaRPr>
-          </a:p>
-        </p:txBody>
-      </p:sp>
-      <p:sp>
-        <p:nvSpPr>
-          <p:cNvPr id="17" name="PlaceHolder 4"/>
-          <p:cNvSpPr>
-            <a:spLocks noGrp="1"/>
-          </p:cNvSpPr>
-          <p:nvPr>
-            <p:ph type="body"/>
-          </p:nvPr>
-        </p:nvSpPr>
-        <p:spPr>
-          <a:xfrm>
-            <a:off x="504000" y="3044160"/>
-            <a:ext cx="4426920" cy="1568160"/>
+            <a:ext cx="4426920" cy="3288600"/>
+          </a:xfrm>
+          <a:prstGeom prst="rect">
+            <a:avLst/>
+          </a:prstGeom>
+        </p:spPr>
+        <p:txBody>
+          <a:bodyPr lIns="0" rIns="0" tIns="0" bIns="0">
+            <a:normAutofit/>
+          </a:bodyPr>
+          <a:p>
+            <a:endParaRPr b="0" lang="en-US" sz="3200" spc="-1" strike="noStrike">
+              <a:latin typeface="Arial"/>
+            </a:endParaRPr>
+          </a:p>
+        </p:txBody>
+      </p:sp>
+      <p:sp>
+        <p:nvSpPr>
+          <p:cNvPr id="13" name="PlaceHolder 4"/>
+          <p:cNvSpPr>
+            <a:spLocks noGrp="1"/>
+          </p:cNvSpPr>
+          <p:nvPr>
+            <p:ph type="body"/>
+          </p:nvPr>
+        </p:nvSpPr>
+        <p:spPr>
+          <a:xfrm>
+            <a:off x="504000" y="3044520"/>
+            <a:ext cx="4426920" cy="1568520"/>
           </a:xfrm>
           <a:prstGeom prst="rect">
             <a:avLst/>
@@ -1101,7 +1101,7 @@
       </p:grpSpPr>
       <p:sp>
         <p:nvSpPr>
-          <p:cNvPr id="18" name="PlaceHolder 1"/>
+          <p:cNvPr id="14" name="PlaceHolder 1"/>
           <p:cNvSpPr>
             <a:spLocks noGrp="1"/>
           </p:cNvSpPr>
@@ -1112,7 +1112,7 @@
         <p:spPr>
           <a:xfrm>
             <a:off x="504000" y="226080"/>
-            <a:ext cx="9071640" cy="946440"/>
+            <a:ext cx="9071280" cy="946080"/>
           </a:xfrm>
           <a:prstGeom prst="rect">
             <a:avLst/>
@@ -1132,7 +1132,7 @@
       </p:sp>
       <p:sp>
         <p:nvSpPr>
-          <p:cNvPr id="19" name="PlaceHolder 2"/>
+          <p:cNvPr id="15" name="PlaceHolder 2"/>
           <p:cNvSpPr>
             <a:spLocks noGrp="1"/>
           </p:cNvSpPr>
@@ -1143,26 +1143,26 @@
         <p:spPr>
           <a:xfrm>
             <a:off x="504000" y="1326600"/>
-            <a:ext cx="4426920" cy="3288240"/>
-          </a:xfrm>
-          <a:prstGeom prst="rect">
-            <a:avLst/>
-          </a:prstGeom>
-        </p:spPr>
-        <p:txBody>
-          <a:bodyPr lIns="0" rIns="0" tIns="0" bIns="0">
-            <a:normAutofit/>
-          </a:bodyPr>
-          <a:p>
-            <a:endParaRPr b="0" lang="en-US" sz="3200" spc="-1" strike="noStrike">
-              <a:latin typeface="Arial"/>
-            </a:endParaRPr>
-          </a:p>
-        </p:txBody>
-      </p:sp>
-      <p:sp>
-        <p:nvSpPr>
-          <p:cNvPr id="20" name="PlaceHolder 3"/>
+            <a:ext cx="4426920" cy="3288600"/>
+          </a:xfrm>
+          <a:prstGeom prst="rect">
+            <a:avLst/>
+          </a:prstGeom>
+        </p:spPr>
+        <p:txBody>
+          <a:bodyPr lIns="0" rIns="0" tIns="0" bIns="0">
+            <a:normAutofit/>
+          </a:bodyPr>
+          <a:p>
+            <a:endParaRPr b="0" lang="en-US" sz="3200" spc="-1" strike="noStrike">
+              <a:latin typeface="Arial"/>
+            </a:endParaRPr>
+          </a:p>
+        </p:txBody>
+      </p:sp>
+      <p:sp>
+        <p:nvSpPr>
+          <p:cNvPr id="16" name="PlaceHolder 3"/>
           <p:cNvSpPr>
             <a:spLocks noGrp="1"/>
           </p:cNvSpPr>
@@ -1173,37 +1173,37 @@
         <p:spPr>
           <a:xfrm>
             <a:off x="5152680" y="1326600"/>
-            <a:ext cx="4426920" cy="1568160"/>
-          </a:xfrm>
-          <a:prstGeom prst="rect">
-            <a:avLst/>
-          </a:prstGeom>
-        </p:spPr>
-        <p:txBody>
-          <a:bodyPr lIns="0" rIns="0" tIns="0" bIns="0">
-            <a:normAutofit/>
-          </a:bodyPr>
-          <a:p>
-            <a:endParaRPr b="0" lang="en-US" sz="3200" spc="-1" strike="noStrike">
-              <a:latin typeface="Arial"/>
-            </a:endParaRPr>
-          </a:p>
-        </p:txBody>
-      </p:sp>
-      <p:sp>
-        <p:nvSpPr>
-          <p:cNvPr id="21" name="PlaceHolder 4"/>
-          <p:cNvSpPr>
-            <a:spLocks noGrp="1"/>
-          </p:cNvSpPr>
-          <p:nvPr>
-            <p:ph type="body"/>
-          </p:nvPr>
-        </p:nvSpPr>
-        <p:spPr>
-          <a:xfrm>
-            <a:off x="5152680" y="3044160"/>
-            <a:ext cx="4426920" cy="1568160"/>
+            <a:ext cx="4426920" cy="1568520"/>
+          </a:xfrm>
+          <a:prstGeom prst="rect">
+            <a:avLst/>
+          </a:prstGeom>
+        </p:spPr>
+        <p:txBody>
+          <a:bodyPr lIns="0" rIns="0" tIns="0" bIns="0">
+            <a:normAutofit/>
+          </a:bodyPr>
+          <a:p>
+            <a:endParaRPr b="0" lang="en-US" sz="3200" spc="-1" strike="noStrike">
+              <a:latin typeface="Arial"/>
+            </a:endParaRPr>
+          </a:p>
+        </p:txBody>
+      </p:sp>
+      <p:sp>
+        <p:nvSpPr>
+          <p:cNvPr id="17" name="PlaceHolder 4"/>
+          <p:cNvSpPr>
+            <a:spLocks noGrp="1"/>
+          </p:cNvSpPr>
+          <p:nvPr>
+            <p:ph type="body"/>
+          </p:nvPr>
+        </p:nvSpPr>
+        <p:spPr>
+          <a:xfrm>
+            <a:off x="5152680" y="3044520"/>
+            <a:ext cx="4426920" cy="1568520"/>
           </a:xfrm>
           <a:prstGeom prst="rect">
             <a:avLst/>
@@ -1244,7 +1244,7 @@
       </p:grpSpPr>
       <p:sp>
         <p:nvSpPr>
-          <p:cNvPr id="22" name="PlaceHolder 1"/>
+          <p:cNvPr id="18" name="PlaceHolder 1"/>
           <p:cNvSpPr>
             <a:spLocks noGrp="1"/>
           </p:cNvSpPr>
@@ -1255,7 +1255,7 @@
         <p:spPr>
           <a:xfrm>
             <a:off x="504000" y="226080"/>
-            <a:ext cx="9071640" cy="946440"/>
+            <a:ext cx="9071280" cy="946080"/>
           </a:xfrm>
           <a:prstGeom prst="rect">
             <a:avLst/>
@@ -1275,7 +1275,7 @@
       </p:sp>
       <p:sp>
         <p:nvSpPr>
-          <p:cNvPr id="23" name="PlaceHolder 2"/>
+          <p:cNvPr id="19" name="PlaceHolder 2"/>
           <p:cNvSpPr>
             <a:spLocks noGrp="1"/>
           </p:cNvSpPr>
@@ -1286,26 +1286,26 @@
         <p:spPr>
           <a:xfrm>
             <a:off x="504000" y="1326600"/>
-            <a:ext cx="4426920" cy="1568160"/>
-          </a:xfrm>
-          <a:prstGeom prst="rect">
-            <a:avLst/>
-          </a:prstGeom>
-        </p:spPr>
-        <p:txBody>
-          <a:bodyPr lIns="0" rIns="0" tIns="0" bIns="0">
-            <a:normAutofit/>
-          </a:bodyPr>
-          <a:p>
-            <a:endParaRPr b="0" lang="en-US" sz="3200" spc="-1" strike="noStrike">
-              <a:latin typeface="Arial"/>
-            </a:endParaRPr>
-          </a:p>
-        </p:txBody>
-      </p:sp>
-      <p:sp>
-        <p:nvSpPr>
-          <p:cNvPr id="24" name="PlaceHolder 3"/>
+            <a:ext cx="4426920" cy="1568520"/>
+          </a:xfrm>
+          <a:prstGeom prst="rect">
+            <a:avLst/>
+          </a:prstGeom>
+        </p:spPr>
+        <p:txBody>
+          <a:bodyPr lIns="0" rIns="0" tIns="0" bIns="0">
+            <a:normAutofit/>
+          </a:bodyPr>
+          <a:p>
+            <a:endParaRPr b="0" lang="en-US" sz="3200" spc="-1" strike="noStrike">
+              <a:latin typeface="Arial"/>
+            </a:endParaRPr>
+          </a:p>
+        </p:txBody>
+      </p:sp>
+      <p:sp>
+        <p:nvSpPr>
+          <p:cNvPr id="20" name="PlaceHolder 3"/>
           <p:cNvSpPr>
             <a:spLocks noGrp="1"/>
           </p:cNvSpPr>
@@ -1316,37 +1316,37 @@
         <p:spPr>
           <a:xfrm>
             <a:off x="5152680" y="1326600"/>
-            <a:ext cx="4426920" cy="1568160"/>
-          </a:xfrm>
-          <a:prstGeom prst="rect">
-            <a:avLst/>
-          </a:prstGeom>
-        </p:spPr>
-        <p:txBody>
-          <a:bodyPr lIns="0" rIns="0" tIns="0" bIns="0">
-            <a:normAutofit/>
-          </a:bodyPr>
-          <a:p>
-            <a:endParaRPr b="0" lang="en-US" sz="3200" spc="-1" strike="noStrike">
-              <a:latin typeface="Arial"/>
-            </a:endParaRPr>
-          </a:p>
-        </p:txBody>
-      </p:sp>
-      <p:sp>
-        <p:nvSpPr>
-          <p:cNvPr id="25" name="PlaceHolder 4"/>
-          <p:cNvSpPr>
-            <a:spLocks noGrp="1"/>
-          </p:cNvSpPr>
-          <p:nvPr>
-            <p:ph type="body"/>
-          </p:nvPr>
-        </p:nvSpPr>
-        <p:spPr>
-          <a:xfrm>
-            <a:off x="504000" y="3044160"/>
-            <a:ext cx="9071640" cy="1568160"/>
+            <a:ext cx="4426920" cy="1568520"/>
+          </a:xfrm>
+          <a:prstGeom prst="rect">
+            <a:avLst/>
+          </a:prstGeom>
+        </p:spPr>
+        <p:txBody>
+          <a:bodyPr lIns="0" rIns="0" tIns="0" bIns="0">
+            <a:normAutofit/>
+          </a:bodyPr>
+          <a:p>
+            <a:endParaRPr b="0" lang="en-US" sz="3200" spc="-1" strike="noStrike">
+              <a:latin typeface="Arial"/>
+            </a:endParaRPr>
+          </a:p>
+        </p:txBody>
+      </p:sp>
+      <p:sp>
+        <p:nvSpPr>
+          <p:cNvPr id="21" name="PlaceHolder 4"/>
+          <p:cNvSpPr>
+            <a:spLocks noGrp="1"/>
+          </p:cNvSpPr>
+          <p:nvPr>
+            <p:ph type="body"/>
+          </p:nvPr>
+        </p:nvSpPr>
+        <p:spPr>
+          <a:xfrm>
+            <a:off x="504000" y="3044520"/>
+            <a:ext cx="9072000" cy="1568520"/>
           </a:xfrm>
           <a:prstGeom prst="rect">
             <a:avLst/>
@@ -1398,7 +1398,7 @@
         <p:spPr>
           <a:xfrm>
             <a:off x="504000" y="226080"/>
-            <a:ext cx="9071640" cy="946440"/>
+            <a:ext cx="9071280" cy="946080"/>
           </a:xfrm>
           <a:prstGeom prst="rect">
             <a:avLst/>
@@ -1411,302 +1411,13 @@
           <a:p>
             <a:pPr algn="ctr"/>
             <a:r>
-              <a:rPr b="0" lang="en-US" sz="4400" spc="-1" strike="noStrike">
+              <a:rPr b="0" lang="en-US" sz="1800" spc="-1" strike="noStrike">
                 <a:latin typeface="Arial"/>
               </a:rPr>
               <a:t>Click to edit the title text format</a:t>
             </a:r>
-            <a:endParaRPr b="0" lang="en-US" sz="4400" spc="-1" strike="noStrike">
-              <a:latin typeface="Arial"/>
-            </a:endParaRPr>
-          </a:p>
-        </p:txBody>
-      </p:sp>
-      <p:sp>
-        <p:nvSpPr>
-          <p:cNvPr id="1" name="PlaceHolder 2"/>
-          <p:cNvSpPr>
-            <a:spLocks noGrp="1"/>
-          </p:cNvSpPr>
-          <p:nvPr>
-            <p:ph type="body"/>
-          </p:nvPr>
-        </p:nvSpPr>
-        <p:spPr>
-          <a:xfrm>
-            <a:off x="504000" y="1326600"/>
-            <a:ext cx="9071640" cy="3288240"/>
-          </a:xfrm>
-          <a:prstGeom prst="rect">
-            <a:avLst/>
-          </a:prstGeom>
-        </p:spPr>
-        <p:txBody>
-          <a:bodyPr lIns="0" rIns="0" tIns="0" bIns="0">
-            <a:normAutofit/>
-          </a:bodyPr>
-          <a:p>
-            <a:pPr marL="432000" indent="-324000">
-              <a:spcBef>
-                <a:spcPts val="1417"/>
-              </a:spcBef>
-              <a:buClr>
-                <a:srgbClr val="000000"/>
-              </a:buClr>
-              <a:buSzPct val="45000"/>
-              <a:buFont typeface="Wingdings" charset="2"/>
-              <a:buChar char=""/>
-            </a:pPr>
-            <a:r>
-              <a:rPr b="0" lang="en-US" sz="3200" spc="-1" strike="noStrike">
-                <a:latin typeface="Arial"/>
-              </a:rPr>
-              <a:t>Click to edit the outline text format</a:t>
-            </a:r>
-            <a:endParaRPr b="0" lang="en-US" sz="3200" spc="-1" strike="noStrike">
-              <a:latin typeface="Arial"/>
-            </a:endParaRPr>
-          </a:p>
-          <a:p>
-            <a:pPr lvl="1" marL="864000" indent="-324000">
-              <a:spcBef>
-                <a:spcPts val="1134"/>
-              </a:spcBef>
-              <a:buClr>
-                <a:srgbClr val="000000"/>
-              </a:buClr>
-              <a:buSzPct val="75000"/>
-              <a:buFont typeface="Symbol" charset="2"/>
-              <a:buChar char=""/>
-            </a:pPr>
-            <a:r>
-              <a:rPr b="0" lang="en-US" sz="2800" spc="-1" strike="noStrike">
-                <a:latin typeface="Arial"/>
-              </a:rPr>
-              <a:t>Second Outline Level</a:t>
-            </a:r>
-            <a:endParaRPr b="0" lang="en-US" sz="2800" spc="-1" strike="noStrike">
-              <a:latin typeface="Arial"/>
-            </a:endParaRPr>
-          </a:p>
-          <a:p>
-            <a:pPr lvl="2" marL="1296000" indent="-288000">
-              <a:spcBef>
-                <a:spcPts val="850"/>
-              </a:spcBef>
-              <a:buClr>
-                <a:srgbClr val="000000"/>
-              </a:buClr>
-              <a:buSzPct val="45000"/>
-              <a:buFont typeface="Wingdings" charset="2"/>
-              <a:buChar char=""/>
-            </a:pPr>
-            <a:r>
-              <a:rPr b="0" lang="en-US" sz="2400" spc="-1" strike="noStrike">
-                <a:latin typeface="Arial"/>
-              </a:rPr>
-              <a:t>Third Outline Level</a:t>
-            </a:r>
-            <a:endParaRPr b="0" lang="en-US" sz="2400" spc="-1" strike="noStrike">
-              <a:latin typeface="Arial"/>
-            </a:endParaRPr>
-          </a:p>
-          <a:p>
-            <a:pPr lvl="3" marL="1728000" indent="-216000">
-              <a:spcBef>
-                <a:spcPts val="567"/>
-              </a:spcBef>
-              <a:buClr>
-                <a:srgbClr val="000000"/>
-              </a:buClr>
-              <a:buSzPct val="75000"/>
-              <a:buFont typeface="Symbol" charset="2"/>
-              <a:buChar char=""/>
-            </a:pPr>
-            <a:r>
-              <a:rPr b="0" lang="en-US" sz="2000" spc="-1" strike="noStrike">
-                <a:latin typeface="Arial"/>
-              </a:rPr>
-              <a:t>Fourth Outline Level</a:t>
-            </a:r>
-            <a:endParaRPr b="0" lang="en-US" sz="2000" spc="-1" strike="noStrike">
-              <a:latin typeface="Arial"/>
-            </a:endParaRPr>
-          </a:p>
-          <a:p>
-            <a:pPr lvl="4" marL="2160000" indent="-216000">
-              <a:spcBef>
-                <a:spcPts val="283"/>
-              </a:spcBef>
-              <a:buClr>
-                <a:srgbClr val="000000"/>
-              </a:buClr>
-              <a:buSzPct val="45000"/>
-              <a:buFont typeface="Wingdings" charset="2"/>
-              <a:buChar char=""/>
-            </a:pPr>
-            <a:r>
-              <a:rPr b="0" lang="en-US" sz="2000" spc="-1" strike="noStrike">
-                <a:latin typeface="Arial"/>
-              </a:rPr>
-              <a:t>Fifth Outline Level</a:t>
-            </a:r>
-            <a:endParaRPr b="0" lang="en-US" sz="2000" spc="-1" strike="noStrike">
-              <a:latin typeface="Arial"/>
-            </a:endParaRPr>
-          </a:p>
-          <a:p>
-            <a:pPr lvl="5" marL="2592000" indent="-216000">
-              <a:spcBef>
-                <a:spcPts val="283"/>
-              </a:spcBef>
-              <a:buClr>
-                <a:srgbClr val="000000"/>
-              </a:buClr>
-              <a:buSzPct val="45000"/>
-              <a:buFont typeface="Wingdings" charset="2"/>
-              <a:buChar char=""/>
-            </a:pPr>
-            <a:r>
-              <a:rPr b="0" lang="en-US" sz="2000" spc="-1" strike="noStrike">
-                <a:latin typeface="Arial"/>
-              </a:rPr>
-              <a:t>Sixth Outline Level</a:t>
-            </a:r>
-            <a:endParaRPr b="0" lang="en-US" sz="2000" spc="-1" strike="noStrike">
-              <a:latin typeface="Arial"/>
-            </a:endParaRPr>
-          </a:p>
-          <a:p>
-            <a:pPr lvl="6" marL="3024000" indent="-216000">
-              <a:spcBef>
-                <a:spcPts val="283"/>
-              </a:spcBef>
-              <a:buClr>
-                <a:srgbClr val="000000"/>
-              </a:buClr>
-              <a:buSzPct val="45000"/>
-              <a:buFont typeface="Wingdings" charset="2"/>
-              <a:buChar char=""/>
-            </a:pPr>
-            <a:r>
-              <a:rPr b="0" lang="en-US" sz="2000" spc="-1" strike="noStrike">
-                <a:latin typeface="Arial"/>
-              </a:rPr>
-              <a:t>Seventh Outline Level</a:t>
-            </a:r>
-            <a:endParaRPr b="0" lang="en-US" sz="2000" spc="-1" strike="noStrike">
-              <a:latin typeface="Arial"/>
-            </a:endParaRPr>
-          </a:p>
-        </p:txBody>
-      </p:sp>
-      <p:sp>
-        <p:nvSpPr>
-          <p:cNvPr id="2" name="PlaceHolder 3"/>
-          <p:cNvSpPr>
-            <a:spLocks noGrp="1"/>
-          </p:cNvSpPr>
-          <p:nvPr>
-            <p:ph type="dt"/>
-          </p:nvPr>
-        </p:nvSpPr>
-        <p:spPr>
-          <a:xfrm>
-            <a:off x="504000" y="5165280"/>
-            <a:ext cx="2348280" cy="390600"/>
-          </a:xfrm>
-          <a:prstGeom prst="rect">
-            <a:avLst/>
-          </a:prstGeom>
-        </p:spPr>
-        <p:txBody>
-          <a:bodyPr lIns="0" rIns="0" tIns="0" bIns="0">
-            <a:noAutofit/>
-          </a:bodyPr>
-          <a:p>
-            <a:r>
-              <a:rPr b="0" lang="en-US" sz="1400" spc="-1" strike="noStrike">
-                <a:latin typeface="Times New Roman"/>
-              </a:rPr>
-              <a:t>&lt;date/time&gt;</a:t>
-            </a:r>
-            <a:endParaRPr b="0" lang="en-US" sz="1400" spc="-1" strike="noStrike">
-              <a:latin typeface="Times New Roman"/>
-            </a:endParaRPr>
-          </a:p>
-        </p:txBody>
-      </p:sp>
-      <p:sp>
-        <p:nvSpPr>
-          <p:cNvPr id="3" name="PlaceHolder 4"/>
-          <p:cNvSpPr>
-            <a:spLocks noGrp="1"/>
-          </p:cNvSpPr>
-          <p:nvPr>
-            <p:ph type="ftr"/>
-          </p:nvPr>
-        </p:nvSpPr>
-        <p:spPr>
-          <a:xfrm>
-            <a:off x="3447360" y="5165280"/>
-            <a:ext cx="3195000" cy="390600"/>
-          </a:xfrm>
-          <a:prstGeom prst="rect">
-            <a:avLst/>
-          </a:prstGeom>
-        </p:spPr>
-        <p:txBody>
-          <a:bodyPr lIns="0" rIns="0" tIns="0" bIns="0">
-            <a:noAutofit/>
-          </a:bodyPr>
-          <a:p>
-            <a:pPr algn="ctr"/>
-            <a:r>
-              <a:rPr b="0" lang="en-US" sz="1400" spc="-1" strike="noStrike">
-                <a:latin typeface="Times New Roman"/>
-              </a:rPr>
-              <a:t>&lt;footer&gt;</a:t>
-            </a:r>
-            <a:endParaRPr b="0" lang="en-US" sz="1400" spc="-1" strike="noStrike">
-              <a:latin typeface="Times New Roman"/>
-            </a:endParaRPr>
-          </a:p>
-        </p:txBody>
-      </p:sp>
-      <p:sp>
-        <p:nvSpPr>
-          <p:cNvPr id="4" name="PlaceHolder 5"/>
-          <p:cNvSpPr>
-            <a:spLocks noGrp="1"/>
-          </p:cNvSpPr>
-          <p:nvPr>
-            <p:ph type="sldNum"/>
-          </p:nvPr>
-        </p:nvSpPr>
-        <p:spPr>
-          <a:xfrm>
-            <a:off x="7227360" y="5165280"/>
-            <a:ext cx="2348280" cy="390600"/>
-          </a:xfrm>
-          <a:prstGeom prst="rect">
-            <a:avLst/>
-          </a:prstGeom>
-        </p:spPr>
-        <p:txBody>
-          <a:bodyPr lIns="0" rIns="0" tIns="0" bIns="0">
-            <a:noAutofit/>
-          </a:bodyPr>
-          <a:p>
-            <a:pPr algn="r"/>
-            <a:fld id="{68EC6411-C755-4111-9572-2BE346401029}" type="slidenum">
-              <a:rPr b="0" lang="en-US" sz="1400" spc="-1" strike="noStrike">
-                <a:latin typeface="Times New Roman"/>
-              </a:rPr>
-              <a:t>&lt;number&gt;</a:t>
-            </a:fld>
-            <a:endParaRPr b="0" lang="en-US" sz="1400" spc="-1" strike="noStrike">
-              <a:latin typeface="Times New Roman"/>
+            <a:endParaRPr b="0" lang="en-US" sz="1800" spc="-1" strike="noStrike">
+              <a:latin typeface="Arial"/>
             </a:endParaRPr>
           </a:p>
         </p:txBody>
@@ -1750,14 +1461,14 @@
       </p:grpSpPr>
       <p:sp>
         <p:nvSpPr>
-          <p:cNvPr id="41" name="TextShape 1"/>
-          <p:cNvSpPr txBox="1"/>
+          <p:cNvPr id="37" name="CustomShape 1"/>
+          <p:cNvSpPr/>
           <p:nvPr/>
         </p:nvSpPr>
         <p:spPr>
           <a:xfrm>
             <a:off x="504000" y="226080"/>
-            <a:ext cx="9071640" cy="946440"/>
+            <a:ext cx="9071280" cy="946080"/>
           </a:xfrm>
           <a:prstGeom prst="rect">
             <a:avLst/>
@@ -1767,28 +1478,23 @@
             <a:noFill/>
           </a:ln>
         </p:spPr>
-        <p:txBody>
-          <a:bodyPr lIns="0" rIns="0" tIns="0" bIns="0" anchor="ctr">
-            <a:noAutofit/>
-          </a:bodyPr>
-          <a:p>
-            <a:pPr algn="ctr"/>
-            <a:endParaRPr b="0" lang="en-US" sz="4400" spc="-1" strike="noStrike">
-              <a:latin typeface="Arial"/>
-            </a:endParaRPr>
-          </a:p>
-        </p:txBody>
-      </p:sp>
-      <p:sp>
-        <p:nvSpPr>
-          <p:cNvPr id="42" name="TextShape 2"/>
-          <p:cNvSpPr txBox="1"/>
+        <p:style>
+          <a:lnRef idx="0"/>
+          <a:fillRef idx="0"/>
+          <a:effectRef idx="0"/>
+          <a:fontRef idx="minor"/>
+        </p:style>
+      </p:sp>
+      <p:sp>
+        <p:nvSpPr>
+          <p:cNvPr id="38" name="CustomShape 2"/>
+          <p:cNvSpPr/>
           <p:nvPr/>
         </p:nvSpPr>
         <p:spPr>
           <a:xfrm>
             <a:off x="504000" y="1326600"/>
-            <a:ext cx="9071640" cy="3288240"/>
+            <a:ext cx="9071280" cy="3287880"/>
           </a:xfrm>
           <a:prstGeom prst="rect">
             <a:avLst/>
@@ -1798,17 +1504,42 @@
             <a:noFill/>
           </a:ln>
         </p:spPr>
-        <p:txBody>
-          <a:bodyPr lIns="0" rIns="0" tIns="0" bIns="0" anchor="ctr">
-            <a:noAutofit/>
-          </a:bodyPr>
-          <a:p>
-            <a:pPr algn="ctr"/>
-            <a:endParaRPr b="0" lang="en-US" sz="3200" spc="-1" strike="noStrike">
-              <a:latin typeface="Arial"/>
-            </a:endParaRPr>
-          </a:p>
-        </p:txBody>
+        <p:style>
+          <a:lnRef idx="0"/>
+          <a:fillRef idx="0"/>
+          <a:effectRef idx="0"/>
+          <a:fontRef idx="minor"/>
+        </p:style>
+      </p:sp>
+      <p:sp>
+        <p:nvSpPr>
+          <p:cNvPr id="39" name="CustomShape 3"/>
+          <p:cNvSpPr/>
+          <p:nvPr/>
+        </p:nvSpPr>
+        <p:spPr>
+          <a:xfrm>
+            <a:off x="2011680" y="914400"/>
+            <a:ext cx="7563600" cy="2468880"/>
+          </a:xfrm>
+          <a:prstGeom prst="flowChartMagneticDrum">
+            <a:avLst/>
+          </a:prstGeom>
+          <a:solidFill>
+            <a:srgbClr val="ce9178"/>
+          </a:solidFill>
+          <a:ln>
+            <a:solidFill>
+              <a:srgbClr val="3465a4"/>
+            </a:solidFill>
+          </a:ln>
+        </p:spPr>
+        <p:style>
+          <a:lnRef idx="0"/>
+          <a:fillRef idx="0"/>
+          <a:effectRef idx="0"/>
+          <a:fontRef idx="minor"/>
+        </p:style>
       </p:sp>
     </p:spTree>
   </p:cSld>

</xml_diff>